<commit_message>
fixed little errors add GO function
</commit_message>
<xml_diff>
--- a/userGuide.pptx
+++ b/userGuide.pptx
@@ -309,7 +309,7 @@
           <a:p>
             <a:fld id="{530820CF-B880-4189-942D-D702A7CBA730}" type="datetimeFigureOut">
               <a:rPr lang="zh-CN" altLang="en-US" smtClean="0"/>
-              <a:t>2017/5/13</a:t>
+              <a:t>2017/5/16</a:t>
             </a:fld>
             <a:endParaRPr lang="zh-CN" altLang="en-US"/>
           </a:p>
@@ -474,7 +474,7 @@
           <a:p>
             <a:fld id="{530820CF-B880-4189-942D-D702A7CBA730}" type="datetimeFigureOut">
               <a:rPr lang="zh-CN" altLang="en-US" smtClean="0"/>
-              <a:t>2017/5/13</a:t>
+              <a:t>2017/5/16</a:t>
             </a:fld>
             <a:endParaRPr lang="zh-CN" altLang="en-US"/>
           </a:p>
@@ -649,7 +649,7 @@
           <a:p>
             <a:fld id="{530820CF-B880-4189-942D-D702A7CBA730}" type="datetimeFigureOut">
               <a:rPr lang="zh-CN" altLang="en-US" smtClean="0"/>
-              <a:t>2017/5/13</a:t>
+              <a:t>2017/5/16</a:t>
             </a:fld>
             <a:endParaRPr lang="zh-CN" altLang="en-US"/>
           </a:p>
@@ -814,7 +814,7 @@
           <a:p>
             <a:fld id="{530820CF-B880-4189-942D-D702A7CBA730}" type="datetimeFigureOut">
               <a:rPr lang="zh-CN" altLang="en-US" smtClean="0"/>
-              <a:t>2017/5/13</a:t>
+              <a:t>2017/5/16</a:t>
             </a:fld>
             <a:endParaRPr lang="zh-CN" altLang="en-US"/>
           </a:p>
@@ -1055,7 +1055,7 @@
           <a:p>
             <a:fld id="{530820CF-B880-4189-942D-D702A7CBA730}" type="datetimeFigureOut">
               <a:rPr lang="zh-CN" altLang="en-US" smtClean="0"/>
-              <a:t>2017/5/13</a:t>
+              <a:t>2017/5/16</a:t>
             </a:fld>
             <a:endParaRPr lang="zh-CN" altLang="en-US"/>
           </a:p>
@@ -1338,7 +1338,7 @@
           <a:p>
             <a:fld id="{530820CF-B880-4189-942D-D702A7CBA730}" type="datetimeFigureOut">
               <a:rPr lang="zh-CN" altLang="en-US" smtClean="0"/>
-              <a:t>2017/5/13</a:t>
+              <a:t>2017/5/16</a:t>
             </a:fld>
             <a:endParaRPr lang="zh-CN" altLang="en-US"/>
           </a:p>
@@ -1755,7 +1755,7 @@
           <a:p>
             <a:fld id="{530820CF-B880-4189-942D-D702A7CBA730}" type="datetimeFigureOut">
               <a:rPr lang="zh-CN" altLang="en-US" smtClean="0"/>
-              <a:t>2017/5/13</a:t>
+              <a:t>2017/5/16</a:t>
             </a:fld>
             <a:endParaRPr lang="zh-CN" altLang="en-US"/>
           </a:p>
@@ -1868,7 +1868,7 @@
           <a:p>
             <a:fld id="{530820CF-B880-4189-942D-D702A7CBA730}" type="datetimeFigureOut">
               <a:rPr lang="zh-CN" altLang="en-US" smtClean="0"/>
-              <a:t>2017/5/13</a:t>
+              <a:t>2017/5/16</a:t>
             </a:fld>
             <a:endParaRPr lang="zh-CN" altLang="en-US"/>
           </a:p>
@@ -1958,7 +1958,7 @@
           <a:p>
             <a:fld id="{530820CF-B880-4189-942D-D702A7CBA730}" type="datetimeFigureOut">
               <a:rPr lang="zh-CN" altLang="en-US" smtClean="0"/>
-              <a:t>2017/5/13</a:t>
+              <a:t>2017/5/16</a:t>
             </a:fld>
             <a:endParaRPr lang="zh-CN" altLang="en-US"/>
           </a:p>
@@ -2230,7 +2230,7 @@
           <a:p>
             <a:fld id="{530820CF-B880-4189-942D-D702A7CBA730}" type="datetimeFigureOut">
               <a:rPr lang="zh-CN" altLang="en-US" smtClean="0"/>
-              <a:t>2017/5/13</a:t>
+              <a:t>2017/5/16</a:t>
             </a:fld>
             <a:endParaRPr lang="zh-CN" altLang="en-US"/>
           </a:p>
@@ -2478,7 +2478,7 @@
           <a:p>
             <a:fld id="{530820CF-B880-4189-942D-D702A7CBA730}" type="datetimeFigureOut">
               <a:rPr lang="zh-CN" altLang="en-US" smtClean="0"/>
-              <a:t>2017/5/13</a:t>
+              <a:t>2017/5/16</a:t>
             </a:fld>
             <a:endParaRPr lang="zh-CN" altLang="en-US"/>
           </a:p>
@@ -2686,7 +2686,7 @@
           <a:p>
             <a:fld id="{530820CF-B880-4189-942D-D702A7CBA730}" type="datetimeFigureOut">
               <a:rPr lang="zh-CN" altLang="en-US" smtClean="0"/>
-              <a:t>2017/5/13</a:t>
+              <a:t>2017/5/16</a:t>
             </a:fld>
             <a:endParaRPr lang="zh-CN" altLang="en-US"/>
           </a:p>
@@ -9038,7 +9038,27 @@
           <a:bodyPr/>
           <a:lstStyle/>
           <a:p>
-            <a:endParaRPr lang="zh-CN" altLang="en-US"/>
+            <a:r>
+              <a:rPr lang="en-US" altLang="zh-CN" sz="3200" dirty="0" smtClean="0"/>
+              <a:t>GO enrichment analysis were implemented in </a:t>
+            </a:r>
+            <a:r>
+              <a:rPr lang="en-US" altLang="zh-CN" sz="3200" dirty="0" err="1" smtClean="0"/>
+              <a:t>GOenrichment</a:t>
+            </a:r>
+            <a:r>
+              <a:rPr lang="en-US" altLang="zh-CN" sz="3200" dirty="0" smtClean="0"/>
+              <a:t>() </a:t>
+            </a:r>
+            <a:r>
+              <a:rPr lang="en-US" altLang="zh-CN" sz="3200" dirty="0" err="1" smtClean="0"/>
+              <a:t>func</a:t>
+            </a:r>
+            <a:r>
+              <a:rPr lang="en-US" altLang="zh-CN" sz="3200" dirty="0" smtClean="0"/>
+              <a:t> in geneUtil.py</a:t>
+            </a:r>
+            <a:endParaRPr lang="zh-CN" altLang="en-US" sz="3200" dirty="0"/>
           </a:p>
         </p:txBody>
       </p:sp>
@@ -9057,7 +9077,53 @@
           <a:bodyPr/>
           <a:lstStyle/>
           <a:p>
-            <a:endParaRPr lang="zh-CN" altLang="en-US"/>
+            <a:r>
+              <a:rPr lang="en-US" altLang="zh-CN" dirty="0" smtClean="0"/>
+              <a:t>Fisher’s Exact Test</a:t>
+            </a:r>
+          </a:p>
+          <a:p>
+            <a:r>
+              <a:rPr lang="en-US" altLang="zh-CN" dirty="0" err="1" smtClean="0"/>
+              <a:t>gotablefile</a:t>
+            </a:r>
+            <a:r>
+              <a:rPr lang="en-US" altLang="zh-CN" dirty="0" smtClean="0"/>
+              <a:t> could download from </a:t>
+            </a:r>
+            <a:r>
+              <a:rPr lang="en-US" altLang="zh-CN" dirty="0" err="1" smtClean="0"/>
+              <a:t>ensembl</a:t>
+            </a:r>
+            <a:r>
+              <a:rPr lang="en-US" altLang="zh-CN" dirty="0" smtClean="0"/>
+              <a:t> </a:t>
+            </a:r>
+            <a:r>
+              <a:rPr lang="en-US" altLang="zh-CN" dirty="0" err="1" smtClean="0"/>
+              <a:t>biomart</a:t>
+            </a:r>
+            <a:r>
+              <a:rPr lang="en-US" altLang="zh-CN" dirty="0" smtClean="0"/>
+              <a:t> . An example were </a:t>
+            </a:r>
+            <a:r>
+              <a:rPr lang="en-US" altLang="zh-CN" dirty="0"/>
+              <a:t>given </a:t>
+            </a:r>
+            <a:r>
+              <a:rPr lang="en-US" altLang="zh-CN" dirty="0" smtClean="0"/>
+              <a:t>“</a:t>
+            </a:r>
+            <a:r>
+              <a:rPr lang="en-US" altLang="zh-CN" dirty="0" err="1" smtClean="0"/>
+              <a:t>gotablefile.lite</a:t>
+            </a:r>
+            <a:r>
+              <a:rPr lang="en-US" altLang="zh-CN" smtClean="0"/>
+              <a:t>”</a:t>
+            </a:r>
+            <a:endParaRPr lang="zh-CN" altLang="en-US" dirty="0"/>
           </a:p>
         </p:txBody>
       </p:sp>
@@ -10040,7 +10106,7 @@
         </p:nvSpPr>
         <p:spPr>
           <a:xfrm>
-            <a:off x="3901812" y="4617710"/>
+            <a:off x="3923928" y="4617710"/>
             <a:ext cx="1728192" cy="1152128"/>
           </a:xfrm>
           <a:prstGeom prst="rect">
@@ -10504,7 +10570,11 @@
           <a:p>
             <a:r>
               <a:rPr lang="en-US" altLang="zh-CN" sz="3200" dirty="0" smtClean="0"/>
-              <a:t>results</a:t>
+              <a:t>mode 1 results (many input to </a:t>
+            </a:r>
+            <a:r>
+              <a:rPr lang="en-US" altLang="zh-CN" sz="3200" smtClean="0"/>
+              <a:t>many output)</a:t>
             </a:r>
             <a:endParaRPr lang="zh-CN" altLang="en-US" sz="3200" dirty="0"/>
           </a:p>
@@ -10717,7 +10787,7 @@
           <a:p>
             <a:r>
               <a:rPr lang="en-US" altLang="zh-CN" sz="3200" dirty="0" smtClean="0"/>
-              <a:t>Mode 2</a:t>
+              <a:t>Mode 2: many input to one output</a:t>
             </a:r>
             <a:endParaRPr lang="zh-CN" altLang="en-US" sz="3200" dirty="0"/>
           </a:p>

</xml_diff>

<commit_message>
introduction grammar error fixed
</commit_message>
<xml_diff>
--- a/userGuide.pptx
+++ b/userGuide.pptx
@@ -309,7 +309,7 @@
           <a:p>
             <a:fld id="{530820CF-B880-4189-942D-D702A7CBA730}" type="datetimeFigureOut">
               <a:rPr lang="zh-CN" altLang="en-US" smtClean="0"/>
-              <a:t>2017/5/22</a:t>
+              <a:t>2017/6/2</a:t>
             </a:fld>
             <a:endParaRPr lang="zh-CN" altLang="en-US"/>
           </a:p>
@@ -474,7 +474,7 @@
           <a:p>
             <a:fld id="{530820CF-B880-4189-942D-D702A7CBA730}" type="datetimeFigureOut">
               <a:rPr lang="zh-CN" altLang="en-US" smtClean="0"/>
-              <a:t>2017/5/22</a:t>
+              <a:t>2017/6/2</a:t>
             </a:fld>
             <a:endParaRPr lang="zh-CN" altLang="en-US"/>
           </a:p>
@@ -649,7 +649,7 @@
           <a:p>
             <a:fld id="{530820CF-B880-4189-942D-D702A7CBA730}" type="datetimeFigureOut">
               <a:rPr lang="zh-CN" altLang="en-US" smtClean="0"/>
-              <a:t>2017/5/22</a:t>
+              <a:t>2017/6/2</a:t>
             </a:fld>
             <a:endParaRPr lang="zh-CN" altLang="en-US"/>
           </a:p>
@@ -814,7 +814,7 @@
           <a:p>
             <a:fld id="{530820CF-B880-4189-942D-D702A7CBA730}" type="datetimeFigureOut">
               <a:rPr lang="zh-CN" altLang="en-US" smtClean="0"/>
-              <a:t>2017/5/22</a:t>
+              <a:t>2017/6/2</a:t>
             </a:fld>
             <a:endParaRPr lang="zh-CN" altLang="en-US"/>
           </a:p>
@@ -1055,7 +1055,7 @@
           <a:p>
             <a:fld id="{530820CF-B880-4189-942D-D702A7CBA730}" type="datetimeFigureOut">
               <a:rPr lang="zh-CN" altLang="en-US" smtClean="0"/>
-              <a:t>2017/5/22</a:t>
+              <a:t>2017/6/2</a:t>
             </a:fld>
             <a:endParaRPr lang="zh-CN" altLang="en-US"/>
           </a:p>
@@ -1338,7 +1338,7 @@
           <a:p>
             <a:fld id="{530820CF-B880-4189-942D-D702A7CBA730}" type="datetimeFigureOut">
               <a:rPr lang="zh-CN" altLang="en-US" smtClean="0"/>
-              <a:t>2017/5/22</a:t>
+              <a:t>2017/6/2</a:t>
             </a:fld>
             <a:endParaRPr lang="zh-CN" altLang="en-US"/>
           </a:p>
@@ -1755,7 +1755,7 @@
           <a:p>
             <a:fld id="{530820CF-B880-4189-942D-D702A7CBA730}" type="datetimeFigureOut">
               <a:rPr lang="zh-CN" altLang="en-US" smtClean="0"/>
-              <a:t>2017/5/22</a:t>
+              <a:t>2017/6/2</a:t>
             </a:fld>
             <a:endParaRPr lang="zh-CN" altLang="en-US"/>
           </a:p>
@@ -1868,7 +1868,7 @@
           <a:p>
             <a:fld id="{530820CF-B880-4189-942D-D702A7CBA730}" type="datetimeFigureOut">
               <a:rPr lang="zh-CN" altLang="en-US" smtClean="0"/>
-              <a:t>2017/5/22</a:t>
+              <a:t>2017/6/2</a:t>
             </a:fld>
             <a:endParaRPr lang="zh-CN" altLang="en-US"/>
           </a:p>
@@ -1958,7 +1958,7 @@
           <a:p>
             <a:fld id="{530820CF-B880-4189-942D-D702A7CBA730}" type="datetimeFigureOut">
               <a:rPr lang="zh-CN" altLang="en-US" smtClean="0"/>
-              <a:t>2017/5/22</a:t>
+              <a:t>2017/6/2</a:t>
             </a:fld>
             <a:endParaRPr lang="zh-CN" altLang="en-US"/>
           </a:p>
@@ -2230,7 +2230,7 @@
           <a:p>
             <a:fld id="{530820CF-B880-4189-942D-D702A7CBA730}" type="datetimeFigureOut">
               <a:rPr lang="zh-CN" altLang="en-US" smtClean="0"/>
-              <a:t>2017/5/22</a:t>
+              <a:t>2017/6/2</a:t>
             </a:fld>
             <a:endParaRPr lang="zh-CN" altLang="en-US"/>
           </a:p>
@@ -2478,7 +2478,7 @@
           <a:p>
             <a:fld id="{530820CF-B880-4189-942D-D702A7CBA730}" type="datetimeFigureOut">
               <a:rPr lang="zh-CN" altLang="en-US" smtClean="0"/>
-              <a:t>2017/5/22</a:t>
+              <a:t>2017/6/2</a:t>
             </a:fld>
             <a:endParaRPr lang="zh-CN" altLang="en-US"/>
           </a:p>
@@ -2686,7 +2686,7 @@
           <a:p>
             <a:fld id="{530820CF-B880-4189-942D-D702A7CBA730}" type="datetimeFigureOut">
               <a:rPr lang="zh-CN" altLang="en-US" smtClean="0"/>
-              <a:t>2017/5/22</a:t>
+              <a:t>2017/6/2</a:t>
             </a:fld>
             <a:endParaRPr lang="zh-CN" altLang="en-US"/>
           </a:p>
@@ -3158,11 +3158,7 @@
           <a:p>
             <a:r>
               <a:rPr lang="en-US" altLang="zh-CN" sz="4000" b="1" dirty="0" smtClean="0"/>
-              <a:t>3. </a:t>
-            </a:r>
-            <a:r>
-              <a:rPr lang="en-US" altLang="zh-CN" sz="4000" b="1" dirty="0" smtClean="0"/>
-              <a:t>Task </a:t>
+              <a:t>3. Task </a:t>
             </a:r>
             <a:r>
               <a:rPr lang="en-US" altLang="zh-CN" sz="4000" b="1" smtClean="0"/>
@@ -7765,8 +7761,25 @@
           <a:p>
             <a:r>
               <a:rPr lang="en-US" altLang="zh-CN" dirty="0" smtClean="0"/>
-              <a:t>Current version mainly consist of four modules, focus on evolutionary genomics, and could be easy to develop into more powerful system to visualize, mine and analyses genomes.</a:t>
-            </a:r>
+              <a:t>Current version mainly consist of four modules, focus on evolutionary genomics, and could be </a:t>
+            </a:r>
+            <a:r>
+              <a:rPr lang="en-US" altLang="zh-CN" dirty="0" smtClean="0"/>
+              <a:t>easily develop </a:t>
+            </a:r>
+            <a:r>
+              <a:rPr lang="en-US" altLang="zh-CN" dirty="0" smtClean="0"/>
+              <a:t>into more powerful system to visualize, mine and </a:t>
+            </a:r>
+            <a:r>
+              <a:rPr lang="en-US" altLang="zh-CN" smtClean="0"/>
+              <a:t>analyses </a:t>
+            </a:r>
+            <a:r>
+              <a:rPr lang="en-US" altLang="zh-CN" smtClean="0"/>
+              <a:t>genomes data.</a:t>
+            </a:r>
+            <a:endParaRPr lang="en-US" altLang="zh-CN" dirty="0" smtClean="0"/>
           </a:p>
           <a:p>
             <a:r>
@@ -9188,15 +9201,7 @@
           <a:p>
             <a:r>
               <a:rPr lang="en-US" altLang="zh-CN" sz="4000" b="1" dirty="0" smtClean="0"/>
-              <a:t>1. data </a:t>
-            </a:r>
-            <a:r>
-              <a:rPr lang="en-US" altLang="zh-CN" sz="4000" b="1" dirty="0" smtClean="0"/>
-              <a:t>management and visualization </a:t>
-            </a:r>
-            <a:r>
-              <a:rPr lang="en-US" altLang="zh-CN" sz="4000" b="1" dirty="0" smtClean="0"/>
-              <a:t>module</a:t>
+              <a:t>1. data management and visualization module</a:t>
             </a:r>
             <a:endParaRPr lang="zh-CN" altLang="en-US" sz="4000" b="1" dirty="0"/>
           </a:p>
@@ -9390,11 +9395,7 @@
           <a:p>
             <a:r>
               <a:rPr lang="en-US" altLang="zh-CN" sz="3200" dirty="0" smtClean="0"/>
-              <a:t>Data store and </a:t>
-            </a:r>
-            <a:r>
-              <a:rPr lang="en-US" altLang="zh-CN" sz="3200" dirty="0" smtClean="0"/>
-              <a:t>naming agreement</a:t>
+              <a:t>Data store and naming agreement</a:t>
             </a:r>
             <a:endParaRPr lang="zh-CN" altLang="en-US" sz="3200" dirty="0"/>
           </a:p>

</xml_diff>